<commit_message>
Add environment setup links
</commit_message>
<xml_diff>
--- a/02. Environment Setup/Presentation/Environment setup.pptx
+++ b/02. Environment Setup/Presentation/Environment setup.pptx
@@ -5,14 +5,13 @@
     <p:sldMasterId id="2147483648" r:id="rId1"/>
   </p:sldMasterIdLst>
   <p:notesMasterIdLst>
-    <p:notesMasterId r:id="rId7"/>
+    <p:notesMasterId r:id="rId6"/>
   </p:notesMasterIdLst>
   <p:sldIdLst>
     <p:sldId id="321" r:id="rId2"/>
     <p:sldId id="379" r:id="rId3"/>
     <p:sldId id="324" r:id="rId4"/>
-    <p:sldId id="340" r:id="rId5"/>
-    <p:sldId id="325" r:id="rId6"/>
+    <p:sldId id="325" r:id="rId5"/>
   </p:sldIdLst>
   <p:sldSz cx="12192000" cy="6858000"/>
   <p:notesSz cx="6858000" cy="9144000"/>
@@ -201,7 +200,7 @@
           <a:p>
             <a:fld id="{7387BF4C-1AC5-8047-9CB7-F6FE835C9ED7}" type="datetimeFigureOut">
               <a:rPr lang="en-US" smtClean="0"/>
-              <a:t>5/27/23</a:t>
+              <a:t>5/28/23</a:t>
             </a:fld>
             <a:endParaRPr lang="en-US"/>
           </a:p>
@@ -468,256 +467,6 @@
 </p:notesMaster>
 </file>
 
-<file path=ppt/notesSlides/notesSlide1.xml><?xml version="1.0" encoding="utf-8"?>
-<p:notes xmlns:a="http://schemas.openxmlformats.org/drawingml/2006/main" xmlns:r="http://schemas.openxmlformats.org/officeDocument/2006/relationships" xmlns:p="http://schemas.openxmlformats.org/presentationml/2006/main">
-  <p:cSld>
-    <p:spTree>
-      <p:nvGrpSpPr>
-        <p:cNvPr id="1" name=""/>
-        <p:cNvGrpSpPr/>
-        <p:nvPr/>
-      </p:nvGrpSpPr>
-      <p:grpSpPr>
-        <a:xfrm>
-          <a:off x="0" y="0"/>
-          <a:ext cx="0" cy="0"/>
-          <a:chOff x="0" y="0"/>
-          <a:chExt cx="0" cy="0"/>
-        </a:xfrm>
-      </p:grpSpPr>
-      <p:sp>
-        <p:nvSpPr>
-          <p:cNvPr id="74753" name="Slide Image Placeholder 1">
-            <a:extLst>
-              <a:ext uri="{FF2B5EF4-FFF2-40B4-BE49-F238E27FC236}">
-                <a16:creationId xmlns:a16="http://schemas.microsoft.com/office/drawing/2014/main" id="{DE31D279-DDF8-05C1-1342-589AB083EA02}"/>
-              </a:ext>
-            </a:extLst>
-          </p:cNvPr>
-          <p:cNvSpPr>
-            <a:spLocks noGrp="1" noRot="1" noChangeAspect="1"/>
-          </p:cNvSpPr>
-          <p:nvPr>
-            <p:ph type="sldImg"/>
-          </p:nvPr>
-        </p:nvSpPr>
-        <p:spPr bwMode="auto">
-          <a:noFill/>
-          <a:ln>
-            <a:solidFill>
-              <a:srgbClr val="000000"/>
-            </a:solidFill>
-            <a:miter lim="800000"/>
-            <a:headEnd/>
-            <a:tailEnd/>
-          </a:ln>
-          <a:extLst>
-            <a:ext uri="{909E8E84-426E-40DD-AFC4-6F175D3DCCD1}">
-              <a14:hiddenFill xmlns:a14="http://schemas.microsoft.com/office/drawing/2010/main">
-                <a:solidFill>
-                  <a:srgbClr val="FFFFFF"/>
-                </a:solidFill>
-              </a14:hiddenFill>
-            </a:ext>
-          </a:extLst>
-        </p:spPr>
-      </p:sp>
-      <p:sp>
-        <p:nvSpPr>
-          <p:cNvPr id="74754" name="Notes Placeholder 2">
-            <a:extLst>
-              <a:ext uri="{FF2B5EF4-FFF2-40B4-BE49-F238E27FC236}">
-                <a16:creationId xmlns:a16="http://schemas.microsoft.com/office/drawing/2014/main" id="{63733F7F-B712-6DA4-40E9-0982A92381CF}"/>
-              </a:ext>
-            </a:extLst>
-          </p:cNvPr>
-          <p:cNvSpPr>
-            <a:spLocks noGrp="1"/>
-          </p:cNvSpPr>
-          <p:nvPr>
-            <p:ph type="body" idx="1"/>
-          </p:nvPr>
-        </p:nvSpPr>
-        <p:spPr bwMode="auto">
-          <a:noFill/>
-          <a:extLst>
-            <a:ext uri="{909E8E84-426E-40DD-AFC4-6F175D3DCCD1}">
-              <a14:hiddenFill xmlns:a14="http://schemas.microsoft.com/office/drawing/2010/main">
-                <a:solidFill>
-                  <a:srgbClr val="FFFFFF"/>
-                </a:solidFill>
-              </a14:hiddenFill>
-            </a:ext>
-            <a:ext uri="{91240B29-F687-4F45-9708-019B960494DF}">
-              <a14:hiddenLine xmlns:a14="http://schemas.microsoft.com/office/drawing/2010/main" w="9525">
-                <a:solidFill>
-                  <a:srgbClr val="000000"/>
-                </a:solidFill>
-                <a:miter lim="800000"/>
-                <a:headEnd/>
-                <a:tailEnd/>
-              </a14:hiddenLine>
-            </a:ext>
-          </a:extLst>
-        </p:spPr>
-        <p:txBody>
-          <a:bodyPr wrap="square" numCol="1" anchor="t" anchorCtr="0" compatLnSpc="1">
-            <a:prstTxWarp prst="textNoShape">
-              <a:avLst/>
-            </a:prstTxWarp>
-          </a:bodyPr>
-          <a:lstStyle/>
-          <a:p>
-            <a:endParaRPr lang="en-US" altLang="en-US">
-              <a:ea typeface="ＭＳ Ｐゴシック" panose="020B0600070205080204" pitchFamily="34" charset="-128"/>
-            </a:endParaRPr>
-          </a:p>
-        </p:txBody>
-      </p:sp>
-      <p:sp>
-        <p:nvSpPr>
-          <p:cNvPr id="4" name="Slide Number Placeholder 3">
-            <a:extLst>
-              <a:ext uri="{FF2B5EF4-FFF2-40B4-BE49-F238E27FC236}">
-                <a16:creationId xmlns:a16="http://schemas.microsoft.com/office/drawing/2014/main" id="{F3A9AB7C-10AC-5ECB-D224-EB4C85D4921B}"/>
-              </a:ext>
-            </a:extLst>
-          </p:cNvPr>
-          <p:cNvSpPr>
-            <a:spLocks noGrp="1"/>
-          </p:cNvSpPr>
-          <p:nvPr>
-            <p:ph type="sldNum" sz="quarter" idx="5"/>
-          </p:nvPr>
-        </p:nvSpPr>
-        <p:spPr/>
-        <p:txBody>
-          <a:bodyPr/>
-          <a:lstStyle>
-            <a:lvl1pPr>
-              <a:defRPr sz="3200">
-                <a:solidFill>
-                  <a:schemeClr val="tx1"/>
-                </a:solidFill>
-                <a:latin typeface="Tahoma" panose="020B0604030504040204" pitchFamily="34" charset="0"/>
-                <a:ea typeface="ＭＳ Ｐゴシック" panose="020B0600070205080204" pitchFamily="34" charset="-128"/>
-              </a:defRPr>
-            </a:lvl1pPr>
-            <a:lvl2pPr marL="742950" indent="-285750">
-              <a:defRPr sz="3200">
-                <a:solidFill>
-                  <a:schemeClr val="tx1"/>
-                </a:solidFill>
-                <a:latin typeface="Tahoma" panose="020B0604030504040204" pitchFamily="34" charset="0"/>
-                <a:ea typeface="ＭＳ Ｐゴシック" panose="020B0600070205080204" pitchFamily="34" charset="-128"/>
-              </a:defRPr>
-            </a:lvl2pPr>
-            <a:lvl3pPr marL="1143000" indent="-228600">
-              <a:defRPr sz="3200">
-                <a:solidFill>
-                  <a:schemeClr val="tx1"/>
-                </a:solidFill>
-                <a:latin typeface="Tahoma" panose="020B0604030504040204" pitchFamily="34" charset="0"/>
-                <a:ea typeface="ＭＳ Ｐゴシック" panose="020B0600070205080204" pitchFamily="34" charset="-128"/>
-              </a:defRPr>
-            </a:lvl3pPr>
-            <a:lvl4pPr marL="1600200" indent="-228600">
-              <a:defRPr sz="3200">
-                <a:solidFill>
-                  <a:schemeClr val="tx1"/>
-                </a:solidFill>
-                <a:latin typeface="Tahoma" panose="020B0604030504040204" pitchFamily="34" charset="0"/>
-                <a:ea typeface="ＭＳ Ｐゴシック" panose="020B0600070205080204" pitchFamily="34" charset="-128"/>
-              </a:defRPr>
-            </a:lvl4pPr>
-            <a:lvl5pPr marL="2057400" indent="-228600">
-              <a:defRPr sz="3200">
-                <a:solidFill>
-                  <a:schemeClr val="tx1"/>
-                </a:solidFill>
-                <a:latin typeface="Tahoma" panose="020B0604030504040204" pitchFamily="34" charset="0"/>
-                <a:ea typeface="ＭＳ Ｐゴシック" panose="020B0600070205080204" pitchFamily="34" charset="-128"/>
-              </a:defRPr>
-            </a:lvl5pPr>
-            <a:lvl6pPr marL="2514600" indent="-228600" eaLnBrk="0" fontAlgn="base" hangingPunct="0">
-              <a:spcBef>
-                <a:spcPct val="0"/>
-              </a:spcBef>
-              <a:spcAft>
-                <a:spcPct val="0"/>
-              </a:spcAft>
-              <a:defRPr sz="3200">
-                <a:solidFill>
-                  <a:schemeClr val="tx1"/>
-                </a:solidFill>
-                <a:latin typeface="Tahoma" panose="020B0604030504040204" pitchFamily="34" charset="0"/>
-                <a:ea typeface="ＭＳ Ｐゴシック" panose="020B0600070205080204" pitchFamily="34" charset="-128"/>
-              </a:defRPr>
-            </a:lvl6pPr>
-            <a:lvl7pPr marL="2971800" indent="-228600" eaLnBrk="0" fontAlgn="base" hangingPunct="0">
-              <a:spcBef>
-                <a:spcPct val="0"/>
-              </a:spcBef>
-              <a:spcAft>
-                <a:spcPct val="0"/>
-              </a:spcAft>
-              <a:defRPr sz="3200">
-                <a:solidFill>
-                  <a:schemeClr val="tx1"/>
-                </a:solidFill>
-                <a:latin typeface="Tahoma" panose="020B0604030504040204" pitchFamily="34" charset="0"/>
-                <a:ea typeface="ＭＳ Ｐゴシック" panose="020B0600070205080204" pitchFamily="34" charset="-128"/>
-              </a:defRPr>
-            </a:lvl7pPr>
-            <a:lvl8pPr marL="3429000" indent="-228600" eaLnBrk="0" fontAlgn="base" hangingPunct="0">
-              <a:spcBef>
-                <a:spcPct val="0"/>
-              </a:spcBef>
-              <a:spcAft>
-                <a:spcPct val="0"/>
-              </a:spcAft>
-              <a:defRPr sz="3200">
-                <a:solidFill>
-                  <a:schemeClr val="tx1"/>
-                </a:solidFill>
-                <a:latin typeface="Tahoma" panose="020B0604030504040204" pitchFamily="34" charset="0"/>
-                <a:ea typeface="ＭＳ Ｐゴシック" panose="020B0600070205080204" pitchFamily="34" charset="-128"/>
-              </a:defRPr>
-            </a:lvl8pPr>
-            <a:lvl9pPr marL="3886200" indent="-228600" eaLnBrk="0" fontAlgn="base" hangingPunct="0">
-              <a:spcBef>
-                <a:spcPct val="0"/>
-              </a:spcBef>
-              <a:spcAft>
-                <a:spcPct val="0"/>
-              </a:spcAft>
-              <a:defRPr sz="3200">
-                <a:solidFill>
-                  <a:schemeClr val="tx1"/>
-                </a:solidFill>
-                <a:latin typeface="Tahoma" panose="020B0604030504040204" pitchFamily="34" charset="0"/>
-                <a:ea typeface="ＭＳ Ｐゴシック" panose="020B0600070205080204" pitchFamily="34" charset="-128"/>
-              </a:defRPr>
-            </a:lvl9pPr>
-          </a:lstStyle>
-          <a:p>
-            <a:fld id="{C1453191-3EB9-6B47-824D-FE6E7342A54E}" type="slidenum">
-              <a:rPr lang="en-US" altLang="en-US" sz="1200"/>
-              <a:pPr/>
-              <a:t>4</a:t>
-            </a:fld>
-            <a:endParaRPr lang="en-US" altLang="en-US" sz="1200"/>
-          </a:p>
-        </p:txBody>
-      </p:sp>
-    </p:spTree>
-  </p:cSld>
-  <p:clrMapOvr>
-    <a:masterClrMapping/>
-  </p:clrMapOvr>
-</p:notes>
-</file>
-
 <file path=ppt/slideLayouts/slideLayout1.xml><?xml version="1.0" encoding="utf-8"?>
 <p:sldLayout xmlns:a="http://schemas.openxmlformats.org/drawingml/2006/main" xmlns:r="http://schemas.openxmlformats.org/officeDocument/2006/relationships" xmlns:p="http://schemas.openxmlformats.org/presentationml/2006/main" type="title" preserve="1">
   <p:cSld name="Title Slide">
@@ -865,7 +614,7 @@
           <a:p>
             <a:fld id="{9AFB0190-E4CB-2F47-BF36-F0D3CAE6AC0E}" type="datetimeFigureOut">
               <a:rPr lang="en-US" smtClean="0"/>
-              <a:t>5/27/23</a:t>
+              <a:t>5/28/23</a:t>
             </a:fld>
             <a:endParaRPr lang="en-US"/>
           </a:p>
@@ -1063,7 +812,7 @@
           <a:p>
             <a:fld id="{9AFB0190-E4CB-2F47-BF36-F0D3CAE6AC0E}" type="datetimeFigureOut">
               <a:rPr lang="en-US" smtClean="0"/>
-              <a:t>5/27/23</a:t>
+              <a:t>5/28/23</a:t>
             </a:fld>
             <a:endParaRPr lang="en-US"/>
           </a:p>
@@ -1271,7 +1020,7 @@
           <a:p>
             <a:fld id="{9AFB0190-E4CB-2F47-BF36-F0D3CAE6AC0E}" type="datetimeFigureOut">
               <a:rPr lang="en-US" smtClean="0"/>
-              <a:t>5/27/23</a:t>
+              <a:t>5/28/23</a:t>
             </a:fld>
             <a:endParaRPr lang="en-US"/>
           </a:p>
@@ -1469,7 +1218,7 @@
           <a:p>
             <a:fld id="{9AFB0190-E4CB-2F47-BF36-F0D3CAE6AC0E}" type="datetimeFigureOut">
               <a:rPr lang="en-US" smtClean="0"/>
-              <a:t>5/27/23</a:t>
+              <a:t>5/28/23</a:t>
             </a:fld>
             <a:endParaRPr lang="en-US"/>
           </a:p>
@@ -1744,7 +1493,7 @@
           <a:p>
             <a:fld id="{9AFB0190-E4CB-2F47-BF36-F0D3CAE6AC0E}" type="datetimeFigureOut">
               <a:rPr lang="en-US" smtClean="0"/>
-              <a:t>5/27/23</a:t>
+              <a:t>5/28/23</a:t>
             </a:fld>
             <a:endParaRPr lang="en-US"/>
           </a:p>
@@ -2009,7 +1758,7 @@
           <a:p>
             <a:fld id="{9AFB0190-E4CB-2F47-BF36-F0D3CAE6AC0E}" type="datetimeFigureOut">
               <a:rPr lang="en-US" smtClean="0"/>
-              <a:t>5/27/23</a:t>
+              <a:t>5/28/23</a:t>
             </a:fld>
             <a:endParaRPr lang="en-US"/>
           </a:p>
@@ -2421,7 +2170,7 @@
           <a:p>
             <a:fld id="{9AFB0190-E4CB-2F47-BF36-F0D3CAE6AC0E}" type="datetimeFigureOut">
               <a:rPr lang="en-US" smtClean="0"/>
-              <a:t>5/27/23</a:t>
+              <a:t>5/28/23</a:t>
             </a:fld>
             <a:endParaRPr lang="en-US"/>
           </a:p>
@@ -2562,7 +2311,7 @@
           <a:p>
             <a:fld id="{9AFB0190-E4CB-2F47-BF36-F0D3CAE6AC0E}" type="datetimeFigureOut">
               <a:rPr lang="en-US" smtClean="0"/>
-              <a:t>5/27/23</a:t>
+              <a:t>5/28/23</a:t>
             </a:fld>
             <a:endParaRPr lang="en-US"/>
           </a:p>
@@ -2675,7 +2424,7 @@
           <a:p>
             <a:fld id="{9AFB0190-E4CB-2F47-BF36-F0D3CAE6AC0E}" type="datetimeFigureOut">
               <a:rPr lang="en-US" smtClean="0"/>
-              <a:t>5/27/23</a:t>
+              <a:t>5/28/23</a:t>
             </a:fld>
             <a:endParaRPr lang="en-US"/>
           </a:p>
@@ -2986,7 +2735,7 @@
           <a:p>
             <a:fld id="{9AFB0190-E4CB-2F47-BF36-F0D3CAE6AC0E}" type="datetimeFigureOut">
               <a:rPr lang="en-US" smtClean="0"/>
-              <a:t>5/27/23</a:t>
+              <a:t>5/28/23</a:t>
             </a:fld>
             <a:endParaRPr lang="en-US"/>
           </a:p>
@@ -3274,7 +3023,7 @@
           <a:p>
             <a:fld id="{9AFB0190-E4CB-2F47-BF36-F0D3CAE6AC0E}" type="datetimeFigureOut">
               <a:rPr lang="en-US" smtClean="0"/>
-              <a:t>5/27/23</a:t>
+              <a:t>5/28/23</a:t>
             </a:fld>
             <a:endParaRPr lang="en-US"/>
           </a:p>
@@ -3518,7 +3267,7 @@
           <a:p>
             <a:fld id="{9AFB0190-E4CB-2F47-BF36-F0D3CAE6AC0E}" type="datetimeFigureOut">
               <a:rPr lang="en-US" smtClean="0"/>
-              <a:t>5/27/23</a:t>
+              <a:t>5/28/23</a:t>
             </a:fld>
             <a:endParaRPr lang="en-US"/>
           </a:p>
@@ -4352,1516 +4101,6 @@
 </file>
 
 <file path=ppt/slides/slide4.xml><?xml version="1.0" encoding="utf-8"?>
-<p:sld xmlns:a="http://schemas.openxmlformats.org/drawingml/2006/main" xmlns:r="http://schemas.openxmlformats.org/officeDocument/2006/relationships" xmlns:p="http://schemas.openxmlformats.org/presentationml/2006/main" showMasterPhAnim="0">
-  <p:cSld>
-    <p:spTree>
-      <p:nvGrpSpPr>
-        <p:cNvPr id="1" name=""/>
-        <p:cNvGrpSpPr/>
-        <p:nvPr/>
-      </p:nvGrpSpPr>
-      <p:grpSpPr>
-        <a:xfrm>
-          <a:off x="0" y="0"/>
-          <a:ext cx="0" cy="0"/>
-          <a:chOff x="0" y="0"/>
-          <a:chExt cx="0" cy="0"/>
-        </a:xfrm>
-      </p:grpSpPr>
-      <p:sp>
-        <p:nvSpPr>
-          <p:cNvPr id="137218" name="Rectangle 2">
-            <a:extLst>
-              <a:ext uri="{FF2B5EF4-FFF2-40B4-BE49-F238E27FC236}">
-                <a16:creationId xmlns:a16="http://schemas.microsoft.com/office/drawing/2014/main" id="{E4B71198-0335-E2AE-1C82-234D2ECB03B7}"/>
-              </a:ext>
-            </a:extLst>
-          </p:cNvPr>
-          <p:cNvSpPr>
-            <a:spLocks noGrp="1" noRot="1" noChangeArrowheads="1"/>
-          </p:cNvSpPr>
-          <p:nvPr>
-            <p:ph type="title"/>
-          </p:nvPr>
-        </p:nvSpPr>
-        <p:spPr/>
-        <p:txBody>
-          <a:bodyPr/>
-          <a:lstStyle/>
-          <a:p>
-            <a:pPr eaLnBrk="1" hangingPunct="1"/>
-            <a:r>
-              <a:rPr lang="en-US" altLang="en-US"/>
-              <a:t>Java Code Execution</a:t>
-            </a:r>
-          </a:p>
-        </p:txBody>
-      </p:sp>
-      <p:sp>
-        <p:nvSpPr>
-          <p:cNvPr id="137220" name="Rectangle 4">
-            <a:extLst>
-              <a:ext uri="{FF2B5EF4-FFF2-40B4-BE49-F238E27FC236}">
-                <a16:creationId xmlns:a16="http://schemas.microsoft.com/office/drawing/2014/main" id="{5034C8DC-DEDA-8992-C1ED-A330F4CC2304}"/>
-              </a:ext>
-            </a:extLst>
-          </p:cNvPr>
-          <p:cNvSpPr>
-            <a:spLocks noChangeArrowheads="1"/>
-          </p:cNvSpPr>
-          <p:nvPr/>
-        </p:nvSpPr>
-        <p:spPr bwMode="auto">
-          <a:xfrm>
-            <a:off x="2514600" y="2438400"/>
-            <a:ext cx="1600200" cy="762000"/>
-          </a:xfrm>
-          <a:prstGeom prst="rect">
-            <a:avLst/>
-          </a:prstGeom>
-          <a:solidFill>
-            <a:schemeClr val="accent1">
-              <a:lumMod val="75000"/>
-            </a:schemeClr>
-          </a:solidFill>
-          <a:ln w="9525">
-            <a:solidFill>
-              <a:schemeClr val="tx1"/>
-            </a:solidFill>
-            <a:miter lim="800000"/>
-            <a:headEnd/>
-            <a:tailEnd/>
-          </a:ln>
-          <a:effectLst/>
-          <a:extLst>
-            <a:ext uri="{AF507438-7753-43e0-B8FC-AC1667EBCBE1}">
-              <a14:hiddenEffects xmlns:a14="http://schemas.microsoft.com/office/drawing/2010/main" xmlns="">
-                <a:effectLst>
-                  <a:outerShdw blurRad="63500" dist="38099" dir="2700000" algn="ctr" rotWithShape="0">
-                    <a:schemeClr val="bg2">
-                      <a:alpha val="74998"/>
-                    </a:schemeClr>
-                  </a:outerShdw>
-                </a:effectLst>
-              </a14:hiddenEffects>
-            </a:ext>
-          </a:extLst>
-        </p:spPr>
-        <p:txBody>
-          <a:bodyPr wrap="none" anchor="ctr"/>
-          <a:lstStyle/>
-          <a:p>
-            <a:pPr algn="ctr">
-              <a:defRPr/>
-            </a:pPr>
-            <a:r>
-              <a:rPr lang="en-US" sz="1600" dirty="0">
-                <a:latin typeface="Tahoma" charset="0"/>
-                <a:ea typeface="ＭＳ Ｐゴシック" charset="0"/>
-              </a:rPr>
-              <a:t>Java source code</a:t>
-            </a:r>
-          </a:p>
-        </p:txBody>
-      </p:sp>
-      <p:sp>
-        <p:nvSpPr>
-          <p:cNvPr id="137222" name="Line 6">
-            <a:extLst>
-              <a:ext uri="{FF2B5EF4-FFF2-40B4-BE49-F238E27FC236}">
-                <a16:creationId xmlns:a16="http://schemas.microsoft.com/office/drawing/2014/main" id="{4A92EE9A-52D7-8E52-ABA9-BF8390C36420}"/>
-              </a:ext>
-            </a:extLst>
-          </p:cNvPr>
-          <p:cNvSpPr>
-            <a:spLocks noChangeShapeType="1"/>
-          </p:cNvSpPr>
-          <p:nvPr/>
-        </p:nvSpPr>
-        <p:spPr bwMode="auto">
-          <a:xfrm>
-            <a:off x="4114800" y="2819400"/>
-            <a:ext cx="762000" cy="0"/>
-          </a:xfrm>
-          <a:prstGeom prst="line">
-            <a:avLst/>
-          </a:prstGeom>
-          <a:noFill/>
-          <a:ln w="9525">
-            <a:solidFill>
-              <a:schemeClr val="tx1"/>
-            </a:solidFill>
-            <a:round/>
-            <a:headEnd/>
-            <a:tailEnd type="triangle" w="med" len="med"/>
-          </a:ln>
-          <a:effectLst/>
-          <a:extLst>
-            <a:ext uri="{909E8E84-426E-40dd-AFC4-6F175D3DCCD1}">
-              <a14:hiddenFill xmlns:a14="http://schemas.microsoft.com/office/drawing/2010/main" xmlns="">
-                <a:noFill/>
-              </a14:hiddenFill>
-            </a:ext>
-            <a:ext uri="{AF507438-7753-43e0-B8FC-AC1667EBCBE1}">
-              <a14:hiddenEffects xmlns:a14="http://schemas.microsoft.com/office/drawing/2010/main" xmlns="">
-                <a:effectLst>
-                  <a:outerShdw blurRad="63500" dist="38099" dir="2700000" algn="ctr" rotWithShape="0">
-                    <a:schemeClr val="bg2">
-                      <a:alpha val="74998"/>
-                    </a:schemeClr>
-                  </a:outerShdw>
-                </a:effectLst>
-              </a14:hiddenEffects>
-            </a:ext>
-          </a:extLst>
-        </p:spPr>
-        <p:txBody>
-          <a:bodyPr/>
-          <a:lstStyle/>
-          <a:p>
-            <a:pPr>
-              <a:defRPr/>
-            </a:pPr>
-            <a:endParaRPr lang="en-US">
-              <a:latin typeface="Tahoma" charset="0"/>
-              <a:ea typeface="ＭＳ Ｐゴシック" charset="0"/>
-            </a:endParaRPr>
-          </a:p>
-        </p:txBody>
-      </p:sp>
-      <p:sp>
-        <p:nvSpPr>
-          <p:cNvPr id="137224" name="Text Box 8">
-            <a:extLst>
-              <a:ext uri="{FF2B5EF4-FFF2-40B4-BE49-F238E27FC236}">
-                <a16:creationId xmlns:a16="http://schemas.microsoft.com/office/drawing/2014/main" id="{89A58A7F-C7CD-54D1-6F60-E54A16AD451B}"/>
-              </a:ext>
-            </a:extLst>
-          </p:cNvPr>
-          <p:cNvSpPr txBox="1">
-            <a:spLocks noChangeArrowheads="1"/>
-          </p:cNvSpPr>
-          <p:nvPr/>
-        </p:nvSpPr>
-        <p:spPr bwMode="auto">
-          <a:xfrm>
-            <a:off x="2743201" y="3352801"/>
-            <a:ext cx="1050925" cy="366713"/>
-          </a:xfrm>
-          <a:prstGeom prst="rect">
-            <a:avLst/>
-          </a:prstGeom>
-          <a:noFill/>
-          <a:ln>
-            <a:noFill/>
-          </a:ln>
-          <a:effectLst/>
-          <a:extLst>
-            <a:ext uri="{909E8E84-426E-40dd-AFC4-6F175D3DCCD1}">
-              <a14:hiddenFill xmlns:a14="http://schemas.microsoft.com/office/drawing/2010/main" xmlns="">
-                <a:solidFill>
-                  <a:schemeClr val="accent1"/>
-                </a:solidFill>
-              </a14:hiddenFill>
-            </a:ext>
-            <a:ext uri="{91240B29-F687-4f45-9708-019B960494DF}">
-              <a14:hiddenLine xmlns:a14="http://schemas.microsoft.com/office/drawing/2010/main" xmlns="" w="9525">
-                <a:solidFill>
-                  <a:schemeClr val="tx1"/>
-                </a:solidFill>
-                <a:miter lim="800000"/>
-                <a:headEnd/>
-                <a:tailEnd/>
-              </a14:hiddenLine>
-            </a:ext>
-            <a:ext uri="{AF507438-7753-43e0-B8FC-AC1667EBCBE1}">
-              <a14:hiddenEffects xmlns:a14="http://schemas.microsoft.com/office/drawing/2010/main" xmlns="">
-                <a:effectLst>
-                  <a:outerShdw blurRad="63500" dist="38099" dir="2700000" algn="ctr" rotWithShape="0">
-                    <a:schemeClr val="bg2">
-                      <a:alpha val="74998"/>
-                    </a:schemeClr>
-                  </a:outerShdw>
-                </a:effectLst>
-              </a14:hiddenEffects>
-            </a:ext>
-          </a:extLst>
-        </p:spPr>
-        <p:txBody>
-          <a:bodyPr>
-            <a:spAutoFit/>
-          </a:bodyPr>
-          <a:lstStyle/>
-          <a:p>
-            <a:pPr algn="ctr">
-              <a:defRPr/>
-            </a:pPr>
-            <a:r>
-              <a:rPr lang="en-US" dirty="0">
-                <a:latin typeface="Tahoma" charset="0"/>
-                <a:ea typeface="ＭＳ Ｐゴシック" charset="0"/>
-              </a:rPr>
-              <a:t>.java</a:t>
-            </a:r>
-          </a:p>
-        </p:txBody>
-      </p:sp>
-      <p:sp>
-        <p:nvSpPr>
-          <p:cNvPr id="137225" name="Rectangle 9">
-            <a:extLst>
-              <a:ext uri="{FF2B5EF4-FFF2-40B4-BE49-F238E27FC236}">
-                <a16:creationId xmlns:a16="http://schemas.microsoft.com/office/drawing/2014/main" id="{AD2BE849-81A3-B659-9A86-8159F101B95C}"/>
-              </a:ext>
-            </a:extLst>
-          </p:cNvPr>
-          <p:cNvSpPr>
-            <a:spLocks noChangeArrowheads="1"/>
-          </p:cNvSpPr>
-          <p:nvPr/>
-        </p:nvSpPr>
-        <p:spPr bwMode="auto">
-          <a:xfrm>
-            <a:off x="4876800" y="2452688"/>
-            <a:ext cx="1600200" cy="762000"/>
-          </a:xfrm>
-          <a:prstGeom prst="rect">
-            <a:avLst/>
-          </a:prstGeom>
-          <a:solidFill>
-            <a:schemeClr val="accent1">
-              <a:lumMod val="75000"/>
-            </a:schemeClr>
-          </a:solidFill>
-          <a:ln w="9525">
-            <a:solidFill>
-              <a:schemeClr val="tx1"/>
-            </a:solidFill>
-            <a:miter lim="800000"/>
-            <a:headEnd/>
-            <a:tailEnd/>
-          </a:ln>
-          <a:effectLst/>
-          <a:extLst>
-            <a:ext uri="{AF507438-7753-43e0-B8FC-AC1667EBCBE1}">
-              <a14:hiddenEffects xmlns:a14="http://schemas.microsoft.com/office/drawing/2010/main" xmlns="">
-                <a:effectLst>
-                  <a:outerShdw blurRad="63500" dist="38099" dir="2700000" algn="ctr" rotWithShape="0">
-                    <a:schemeClr val="bg2">
-                      <a:alpha val="74998"/>
-                    </a:schemeClr>
-                  </a:outerShdw>
-                </a:effectLst>
-              </a14:hiddenEffects>
-            </a:ext>
-          </a:extLst>
-        </p:spPr>
-        <p:txBody>
-          <a:bodyPr wrap="none" anchor="ctr"/>
-          <a:lstStyle/>
-          <a:p>
-            <a:pPr algn="ctr"/>
-            <a:r>
-              <a:rPr lang="en-US" sz="1600">
-                <a:latin typeface="Tahoma" charset="0"/>
-                <a:ea typeface="ＭＳ Ｐゴシック" charset="0"/>
-              </a:rPr>
-              <a:t>Java Compiler</a:t>
-            </a:r>
-          </a:p>
-          <a:p>
-            <a:pPr algn="ctr"/>
-            <a:r>
-              <a:rPr lang="en-US" sz="1600">
-                <a:latin typeface="Tahoma" charset="0"/>
-                <a:ea typeface="ＭＳ Ｐゴシック" charset="0"/>
-              </a:rPr>
-              <a:t>(javac)</a:t>
-            </a:r>
-          </a:p>
-        </p:txBody>
-      </p:sp>
-      <p:sp>
-        <p:nvSpPr>
-          <p:cNvPr id="137226" name="Line 10">
-            <a:extLst>
-              <a:ext uri="{FF2B5EF4-FFF2-40B4-BE49-F238E27FC236}">
-                <a16:creationId xmlns:a16="http://schemas.microsoft.com/office/drawing/2014/main" id="{BA919F51-F87F-504C-3C67-B63CDD6240C8}"/>
-              </a:ext>
-            </a:extLst>
-          </p:cNvPr>
-          <p:cNvSpPr>
-            <a:spLocks noChangeShapeType="1"/>
-          </p:cNvSpPr>
-          <p:nvPr/>
-        </p:nvSpPr>
-        <p:spPr bwMode="auto">
-          <a:xfrm>
-            <a:off x="6477000" y="2833688"/>
-            <a:ext cx="762000" cy="0"/>
-          </a:xfrm>
-          <a:prstGeom prst="line">
-            <a:avLst/>
-          </a:prstGeom>
-          <a:noFill/>
-          <a:ln w="9525">
-            <a:solidFill>
-              <a:schemeClr val="tx1"/>
-            </a:solidFill>
-            <a:round/>
-            <a:headEnd/>
-            <a:tailEnd type="triangle" w="med" len="med"/>
-          </a:ln>
-          <a:effectLst/>
-          <a:extLst>
-            <a:ext uri="{909E8E84-426E-40dd-AFC4-6F175D3DCCD1}">
-              <a14:hiddenFill xmlns:a14="http://schemas.microsoft.com/office/drawing/2010/main" xmlns="">
-                <a:noFill/>
-              </a14:hiddenFill>
-            </a:ext>
-            <a:ext uri="{AF507438-7753-43e0-B8FC-AC1667EBCBE1}">
-              <a14:hiddenEffects xmlns:a14="http://schemas.microsoft.com/office/drawing/2010/main" xmlns="">
-                <a:effectLst>
-                  <a:outerShdw blurRad="63500" dist="38099" dir="2700000" algn="ctr" rotWithShape="0">
-                    <a:schemeClr val="bg2">
-                      <a:alpha val="74998"/>
-                    </a:schemeClr>
-                  </a:outerShdw>
-                </a:effectLst>
-              </a14:hiddenEffects>
-            </a:ext>
-          </a:extLst>
-        </p:spPr>
-        <p:txBody>
-          <a:bodyPr/>
-          <a:lstStyle/>
-          <a:p>
-            <a:pPr>
-              <a:defRPr/>
-            </a:pPr>
-            <a:endParaRPr lang="en-US">
-              <a:latin typeface="Tahoma" charset="0"/>
-              <a:ea typeface="ＭＳ Ｐゴシック" charset="0"/>
-            </a:endParaRPr>
-          </a:p>
-        </p:txBody>
-      </p:sp>
-      <p:sp>
-        <p:nvSpPr>
-          <p:cNvPr id="137228" name="Rectangle 12">
-            <a:extLst>
-              <a:ext uri="{FF2B5EF4-FFF2-40B4-BE49-F238E27FC236}">
-                <a16:creationId xmlns:a16="http://schemas.microsoft.com/office/drawing/2014/main" id="{C36B8C8E-EB41-B63E-A850-F95EC2E9D28F}"/>
-              </a:ext>
-            </a:extLst>
-          </p:cNvPr>
-          <p:cNvSpPr>
-            <a:spLocks noChangeArrowheads="1"/>
-          </p:cNvSpPr>
-          <p:nvPr/>
-        </p:nvSpPr>
-        <p:spPr bwMode="auto">
-          <a:xfrm>
-            <a:off x="7239000" y="2438400"/>
-            <a:ext cx="1600200" cy="762000"/>
-          </a:xfrm>
-          <a:prstGeom prst="rect">
-            <a:avLst/>
-          </a:prstGeom>
-          <a:solidFill>
-            <a:schemeClr val="accent1">
-              <a:lumMod val="75000"/>
-            </a:schemeClr>
-          </a:solidFill>
-          <a:ln w="9525">
-            <a:solidFill>
-              <a:schemeClr val="tx1"/>
-            </a:solidFill>
-            <a:miter lim="800000"/>
-            <a:headEnd/>
-            <a:tailEnd/>
-          </a:ln>
-          <a:effectLst/>
-          <a:extLst>
-            <a:ext uri="{AF507438-7753-43e0-B8FC-AC1667EBCBE1}">
-              <a14:hiddenEffects xmlns:a14="http://schemas.microsoft.com/office/drawing/2010/main" xmlns="">
-                <a:effectLst>
-                  <a:outerShdw blurRad="63500" dist="38099" dir="2700000" algn="ctr" rotWithShape="0">
-                    <a:schemeClr val="bg2">
-                      <a:alpha val="74998"/>
-                    </a:schemeClr>
-                  </a:outerShdw>
-                </a:effectLst>
-              </a14:hiddenEffects>
-            </a:ext>
-          </a:extLst>
-        </p:spPr>
-        <p:txBody>
-          <a:bodyPr wrap="none" anchor="ctr"/>
-          <a:lstStyle/>
-          <a:p>
-            <a:pPr algn="ctr"/>
-            <a:r>
-              <a:rPr lang="en-US" sz="1600" dirty="0">
-                <a:latin typeface="Tahoma" charset="0"/>
-                <a:ea typeface="ＭＳ Ｐゴシック" charset="0"/>
-              </a:rPr>
-              <a:t>Java byte code</a:t>
-            </a:r>
-          </a:p>
-          <a:p>
-            <a:pPr algn="ctr"/>
-            <a:r>
-              <a:rPr lang="en-US" sz="1600" dirty="0">
-                <a:latin typeface="Tahoma" charset="0"/>
-                <a:ea typeface="ＭＳ Ｐゴシック" charset="0"/>
-              </a:rPr>
-              <a:t>(platform </a:t>
-            </a:r>
-          </a:p>
-          <a:p>
-            <a:pPr algn="ctr"/>
-            <a:r>
-              <a:rPr lang="en-US" sz="1600" dirty="0">
-                <a:latin typeface="Tahoma" charset="0"/>
-                <a:ea typeface="ＭＳ Ｐゴシック" charset="0"/>
-              </a:rPr>
-              <a:t>Independent)</a:t>
-            </a:r>
-          </a:p>
-        </p:txBody>
-      </p:sp>
-      <p:sp>
-        <p:nvSpPr>
-          <p:cNvPr id="137229" name="Line 13">
-            <a:extLst>
-              <a:ext uri="{FF2B5EF4-FFF2-40B4-BE49-F238E27FC236}">
-                <a16:creationId xmlns:a16="http://schemas.microsoft.com/office/drawing/2014/main" id="{7BC371EF-D1C1-AF0A-49D6-CA8A57ED3DDC}"/>
-              </a:ext>
-            </a:extLst>
-          </p:cNvPr>
-          <p:cNvSpPr>
-            <a:spLocks noChangeShapeType="1"/>
-          </p:cNvSpPr>
-          <p:nvPr/>
-        </p:nvSpPr>
-        <p:spPr bwMode="auto">
-          <a:xfrm flipH="1">
-            <a:off x="8077200" y="3200400"/>
-            <a:ext cx="0" cy="838200"/>
-          </a:xfrm>
-          <a:prstGeom prst="line">
-            <a:avLst/>
-          </a:prstGeom>
-          <a:noFill/>
-          <a:ln w="9525">
-            <a:solidFill>
-              <a:schemeClr val="tx1"/>
-            </a:solidFill>
-            <a:round/>
-            <a:headEnd/>
-            <a:tailEnd type="triangle" w="med" len="med"/>
-          </a:ln>
-          <a:effectLst/>
-          <a:extLst>
-            <a:ext uri="{909E8E84-426E-40dd-AFC4-6F175D3DCCD1}">
-              <a14:hiddenFill xmlns:a14="http://schemas.microsoft.com/office/drawing/2010/main" xmlns="">
-                <a:noFill/>
-              </a14:hiddenFill>
-            </a:ext>
-            <a:ext uri="{AF507438-7753-43e0-B8FC-AC1667EBCBE1}">
-              <a14:hiddenEffects xmlns:a14="http://schemas.microsoft.com/office/drawing/2010/main" xmlns="">
-                <a:effectLst>
-                  <a:outerShdw blurRad="63500" dist="38099" dir="2700000" algn="ctr" rotWithShape="0">
-                    <a:schemeClr val="bg2">
-                      <a:alpha val="74998"/>
-                    </a:schemeClr>
-                  </a:outerShdw>
-                </a:effectLst>
-              </a14:hiddenEffects>
-            </a:ext>
-          </a:extLst>
-        </p:spPr>
-        <p:txBody>
-          <a:bodyPr/>
-          <a:lstStyle/>
-          <a:p>
-            <a:pPr>
-              <a:defRPr/>
-            </a:pPr>
-            <a:endParaRPr lang="en-US">
-              <a:latin typeface="Tahoma" charset="0"/>
-              <a:ea typeface="ＭＳ Ｐゴシック" charset="0"/>
-            </a:endParaRPr>
-          </a:p>
-        </p:txBody>
-      </p:sp>
-      <p:sp>
-        <p:nvSpPr>
-          <p:cNvPr id="137230" name="Text Box 14">
-            <a:extLst>
-              <a:ext uri="{FF2B5EF4-FFF2-40B4-BE49-F238E27FC236}">
-                <a16:creationId xmlns:a16="http://schemas.microsoft.com/office/drawing/2014/main" id="{633FB1E8-BFAC-FFA0-2302-9A49E847E80C}"/>
-              </a:ext>
-            </a:extLst>
-          </p:cNvPr>
-          <p:cNvSpPr txBox="1">
-            <a:spLocks noChangeArrowheads="1"/>
-          </p:cNvSpPr>
-          <p:nvPr/>
-        </p:nvSpPr>
-        <p:spPr bwMode="auto">
-          <a:xfrm>
-            <a:off x="8153401" y="3276601"/>
-            <a:ext cx="1050925" cy="366713"/>
-          </a:xfrm>
-          <a:prstGeom prst="rect">
-            <a:avLst/>
-          </a:prstGeom>
-          <a:noFill/>
-          <a:ln>
-            <a:noFill/>
-          </a:ln>
-          <a:effectLst/>
-          <a:extLst>
-            <a:ext uri="{909E8E84-426E-40dd-AFC4-6F175D3DCCD1}">
-              <a14:hiddenFill xmlns:a14="http://schemas.microsoft.com/office/drawing/2010/main" xmlns="">
-                <a:solidFill>
-                  <a:schemeClr val="accent1"/>
-                </a:solidFill>
-              </a14:hiddenFill>
-            </a:ext>
-            <a:ext uri="{91240B29-F687-4f45-9708-019B960494DF}">
-              <a14:hiddenLine xmlns:a14="http://schemas.microsoft.com/office/drawing/2010/main" xmlns="" w="9525">
-                <a:solidFill>
-                  <a:schemeClr val="tx1"/>
-                </a:solidFill>
-                <a:miter lim="800000"/>
-                <a:headEnd/>
-                <a:tailEnd/>
-              </a14:hiddenLine>
-            </a:ext>
-            <a:ext uri="{AF507438-7753-43e0-B8FC-AC1667EBCBE1}">
-              <a14:hiddenEffects xmlns:a14="http://schemas.microsoft.com/office/drawing/2010/main" xmlns="">
-                <a:effectLst>
-                  <a:outerShdw blurRad="63500" dist="38099" dir="2700000" algn="ctr" rotWithShape="0">
-                    <a:schemeClr val="bg2">
-                      <a:alpha val="74998"/>
-                    </a:schemeClr>
-                  </a:outerShdw>
-                </a:effectLst>
-              </a14:hiddenEffects>
-            </a:ext>
-          </a:extLst>
-        </p:spPr>
-        <p:txBody>
-          <a:bodyPr>
-            <a:spAutoFit/>
-          </a:bodyPr>
-          <a:lstStyle/>
-          <a:p>
-            <a:pPr algn="ctr">
-              <a:defRPr/>
-            </a:pPr>
-            <a:r>
-              <a:rPr lang="en-US">
-                <a:latin typeface="Tahoma" charset="0"/>
-                <a:ea typeface="ＭＳ Ｐゴシック" charset="0"/>
-              </a:rPr>
-              <a:t>.class</a:t>
-            </a:r>
-          </a:p>
-        </p:txBody>
-      </p:sp>
-      <p:sp>
-        <p:nvSpPr>
-          <p:cNvPr id="137231" name="Rectangle 15">
-            <a:extLst>
-              <a:ext uri="{FF2B5EF4-FFF2-40B4-BE49-F238E27FC236}">
-                <a16:creationId xmlns:a16="http://schemas.microsoft.com/office/drawing/2014/main" id="{75EFA18B-1609-09C3-C2ED-6CE0B807DB7E}"/>
-              </a:ext>
-            </a:extLst>
-          </p:cNvPr>
-          <p:cNvSpPr>
-            <a:spLocks noChangeArrowheads="1"/>
-          </p:cNvSpPr>
-          <p:nvPr/>
-        </p:nvSpPr>
-        <p:spPr bwMode="auto">
-          <a:xfrm>
-            <a:off x="7239000" y="4038600"/>
-            <a:ext cx="1600200" cy="762000"/>
-          </a:xfrm>
-          <a:prstGeom prst="rect">
-            <a:avLst/>
-          </a:prstGeom>
-          <a:solidFill>
-            <a:schemeClr val="accent1">
-              <a:lumMod val="75000"/>
-            </a:schemeClr>
-          </a:solidFill>
-          <a:ln w="9525">
-            <a:solidFill>
-              <a:schemeClr val="tx1"/>
-            </a:solidFill>
-            <a:miter lim="800000"/>
-            <a:headEnd/>
-            <a:tailEnd/>
-          </a:ln>
-          <a:effectLst/>
-          <a:extLst>
-            <a:ext uri="{AF507438-7753-43e0-B8FC-AC1667EBCBE1}">
-              <a14:hiddenEffects xmlns:a14="http://schemas.microsoft.com/office/drawing/2010/main" xmlns="">
-                <a:effectLst>
-                  <a:outerShdw blurRad="63500" dist="38099" dir="2700000" algn="ctr" rotWithShape="0">
-                    <a:schemeClr val="bg2">
-                      <a:alpha val="74998"/>
-                    </a:schemeClr>
-                  </a:outerShdw>
-                </a:effectLst>
-              </a14:hiddenEffects>
-            </a:ext>
-          </a:extLst>
-        </p:spPr>
-        <p:txBody>
-          <a:bodyPr wrap="none" anchor="ctr"/>
-          <a:lstStyle/>
-          <a:p>
-            <a:pPr algn="ctr">
-              <a:defRPr/>
-            </a:pPr>
-            <a:r>
-              <a:rPr lang="en-US" sz="1600" dirty="0">
-                <a:latin typeface="Tahoma" charset="0"/>
-                <a:ea typeface="ＭＳ Ｐゴシック" charset="0"/>
-              </a:rPr>
-              <a:t>Execute JRE</a:t>
-            </a:r>
-          </a:p>
-          <a:p>
-            <a:pPr algn="ctr">
-              <a:defRPr/>
-            </a:pPr>
-            <a:r>
-              <a:rPr lang="en-US" sz="1600" dirty="0">
-                <a:latin typeface="Tahoma" charset="0"/>
-                <a:ea typeface="ＭＳ Ｐゴシック" charset="0"/>
-              </a:rPr>
-              <a:t>(java)</a:t>
-            </a:r>
-          </a:p>
-        </p:txBody>
-      </p:sp>
-      <p:sp>
-        <p:nvSpPr>
-          <p:cNvPr id="137234" name="Rectangle 18">
-            <a:extLst>
-              <a:ext uri="{FF2B5EF4-FFF2-40B4-BE49-F238E27FC236}">
-                <a16:creationId xmlns:a16="http://schemas.microsoft.com/office/drawing/2014/main" id="{84899B5E-339A-17BD-BFD7-57C150E1BE54}"/>
-              </a:ext>
-            </a:extLst>
-          </p:cNvPr>
-          <p:cNvSpPr>
-            <a:spLocks noChangeArrowheads="1"/>
-          </p:cNvSpPr>
-          <p:nvPr/>
-        </p:nvSpPr>
-        <p:spPr bwMode="auto">
-          <a:xfrm>
-            <a:off x="4876800" y="4038600"/>
-            <a:ext cx="1600200" cy="762000"/>
-          </a:xfrm>
-          <a:prstGeom prst="rect">
-            <a:avLst/>
-          </a:prstGeom>
-          <a:solidFill>
-            <a:schemeClr val="accent1">
-              <a:lumMod val="75000"/>
-            </a:schemeClr>
-          </a:solidFill>
-          <a:ln w="9525">
-            <a:solidFill>
-              <a:schemeClr val="tx1"/>
-            </a:solidFill>
-            <a:miter lim="800000"/>
-            <a:headEnd/>
-            <a:tailEnd/>
-          </a:ln>
-          <a:effectLst/>
-          <a:extLst>
-            <a:ext uri="{AF507438-7753-43e0-B8FC-AC1667EBCBE1}">
-              <a14:hiddenEffects xmlns:a14="http://schemas.microsoft.com/office/drawing/2010/main" xmlns="">
-                <a:effectLst>
-                  <a:outerShdw blurRad="63500" dist="38099" dir="2700000" algn="ctr" rotWithShape="0">
-                    <a:schemeClr val="bg2">
-                      <a:alpha val="74998"/>
-                    </a:schemeClr>
-                  </a:outerShdw>
-                </a:effectLst>
-              </a14:hiddenEffects>
-            </a:ext>
-          </a:extLst>
-        </p:spPr>
-        <p:txBody>
-          <a:bodyPr wrap="none" anchor="ctr"/>
-          <a:lstStyle/>
-          <a:p>
-            <a:pPr algn="ctr">
-              <a:defRPr/>
-            </a:pPr>
-            <a:r>
-              <a:rPr lang="en-US" sz="1600">
-                <a:latin typeface="Tahoma" charset="0"/>
-                <a:ea typeface="ＭＳ Ｐゴシック" charset="0"/>
-              </a:rPr>
-              <a:t>Expected Result</a:t>
-            </a:r>
-          </a:p>
-        </p:txBody>
-      </p:sp>
-      <p:sp>
-        <p:nvSpPr>
-          <p:cNvPr id="137238" name="Line 22">
-            <a:extLst>
-              <a:ext uri="{FF2B5EF4-FFF2-40B4-BE49-F238E27FC236}">
-                <a16:creationId xmlns:a16="http://schemas.microsoft.com/office/drawing/2014/main" id="{F705AD86-3F97-0378-CD11-BBDC51E6477A}"/>
-              </a:ext>
-            </a:extLst>
-          </p:cNvPr>
-          <p:cNvSpPr>
-            <a:spLocks noChangeShapeType="1"/>
-          </p:cNvSpPr>
-          <p:nvPr/>
-        </p:nvSpPr>
-        <p:spPr bwMode="auto">
-          <a:xfrm flipH="1">
-            <a:off x="6477000" y="4419600"/>
-            <a:ext cx="762000" cy="0"/>
-          </a:xfrm>
-          <a:prstGeom prst="line">
-            <a:avLst/>
-          </a:prstGeom>
-          <a:noFill/>
-          <a:ln w="9525">
-            <a:solidFill>
-              <a:schemeClr val="tx1"/>
-            </a:solidFill>
-            <a:round/>
-            <a:headEnd/>
-            <a:tailEnd type="triangle" w="med" len="med"/>
-          </a:ln>
-          <a:effectLst/>
-          <a:extLst>
-            <a:ext uri="{909E8E84-426E-40dd-AFC4-6F175D3DCCD1}">
-              <a14:hiddenFill xmlns:a14="http://schemas.microsoft.com/office/drawing/2010/main" xmlns="">
-                <a:noFill/>
-              </a14:hiddenFill>
-            </a:ext>
-            <a:ext uri="{AF507438-7753-43e0-B8FC-AC1667EBCBE1}">
-              <a14:hiddenEffects xmlns:a14="http://schemas.microsoft.com/office/drawing/2010/main" xmlns="">
-                <a:effectLst>
-                  <a:outerShdw blurRad="63500" dist="38099" dir="2700000" algn="ctr" rotWithShape="0">
-                    <a:schemeClr val="bg2">
-                      <a:alpha val="74998"/>
-                    </a:schemeClr>
-                  </a:outerShdw>
-                </a:effectLst>
-              </a14:hiddenEffects>
-            </a:ext>
-          </a:extLst>
-        </p:spPr>
-        <p:txBody>
-          <a:bodyPr/>
-          <a:lstStyle/>
-          <a:p>
-            <a:pPr>
-              <a:defRPr/>
-            </a:pPr>
-            <a:endParaRPr lang="en-US">
-              <a:latin typeface="Tahoma" charset="0"/>
-              <a:ea typeface="ＭＳ Ｐゴシック" charset="0"/>
-            </a:endParaRPr>
-          </a:p>
-        </p:txBody>
-      </p:sp>
-    </p:spTree>
-  </p:cSld>
-  <p:clrMapOvr>
-    <a:masterClrMapping/>
-  </p:clrMapOvr>
-  <p:timing>
-    <p:tnLst>
-      <p:par>
-        <p:cTn id="1" dur="indefinite" restart="never" nodeType="tmRoot">
-          <p:childTnLst>
-            <p:seq concurrent="1" nextAc="seek">
-              <p:cTn id="2" dur="indefinite" nodeType="mainSeq">
-                <p:childTnLst>
-                  <p:par>
-                    <p:cTn id="3" fill="hold" nodeType="clickPar">
-                      <p:stCondLst>
-                        <p:cond delay="indefinite"/>
-                      </p:stCondLst>
-                      <p:childTnLst>
-                        <p:par>
-                          <p:cTn id="4" fill="hold" nodeType="withGroup">
-                            <p:stCondLst>
-                              <p:cond delay="0"/>
-                            </p:stCondLst>
-                            <p:childTnLst>
-                              <p:par>
-                                <p:cTn id="5" presetID="4" presetClass="entr" presetSubtype="16" fill="hold" grpId="0" nodeType="clickEffect">
-                                  <p:stCondLst>
-                                    <p:cond delay="0"/>
-                                  </p:stCondLst>
-                                  <p:childTnLst>
-                                    <p:set>
-                                      <p:cBhvr>
-                                        <p:cTn id="6" dur="1" fill="hold">
-                                          <p:stCondLst>
-                                            <p:cond delay="0"/>
-                                          </p:stCondLst>
-                                        </p:cTn>
-                                        <p:tgtEl>
-                                          <p:spTgt spid="137220">
-                                            <p:bg/>
-                                          </p:spTgt>
-                                        </p:tgtEl>
-                                        <p:attrNameLst>
-                                          <p:attrName>style.visibility</p:attrName>
-                                        </p:attrNameLst>
-                                      </p:cBhvr>
-                                      <p:to>
-                                        <p:strVal val="visible"/>
-                                      </p:to>
-                                    </p:set>
-                                    <p:animEffect transition="in" filter="box(in)">
-                                      <p:cBhvr>
-                                        <p:cTn id="7" dur="500"/>
-                                        <p:tgtEl>
-                                          <p:spTgt spid="137220">
-                                            <p:bg/>
-                                          </p:spTgt>
-                                        </p:tgtEl>
-                                      </p:cBhvr>
-                                    </p:animEffect>
-                                  </p:childTnLst>
-                                </p:cTn>
-                              </p:par>
-                              <p:par>
-                                <p:cTn id="8" presetID="4" presetClass="entr" presetSubtype="16" fill="hold" grpId="0" nodeType="withEffect">
-                                  <p:stCondLst>
-                                    <p:cond delay="0"/>
-                                  </p:stCondLst>
-                                  <p:childTnLst>
-                                    <p:set>
-                                      <p:cBhvr>
-                                        <p:cTn id="9" dur="1" fill="hold">
-                                          <p:stCondLst>
-                                            <p:cond delay="0"/>
-                                          </p:stCondLst>
-                                        </p:cTn>
-                                        <p:tgtEl>
-                                          <p:spTgt spid="137220">
-                                            <p:txEl>
-                                              <p:pRg st="0" end="0"/>
-                                            </p:txEl>
-                                          </p:spTgt>
-                                        </p:tgtEl>
-                                        <p:attrNameLst>
-                                          <p:attrName>style.visibility</p:attrName>
-                                        </p:attrNameLst>
-                                      </p:cBhvr>
-                                      <p:to>
-                                        <p:strVal val="visible"/>
-                                      </p:to>
-                                    </p:set>
-                                    <p:animEffect transition="in" filter="box(in)">
-                                      <p:cBhvr>
-                                        <p:cTn id="10" dur="500"/>
-                                        <p:tgtEl>
-                                          <p:spTgt spid="137220">
-                                            <p:txEl>
-                                              <p:pRg st="0" end="0"/>
-                                            </p:txEl>
-                                          </p:spTgt>
-                                        </p:tgtEl>
-                                      </p:cBhvr>
-                                    </p:animEffect>
-                                  </p:childTnLst>
-                                </p:cTn>
-                              </p:par>
-                            </p:childTnLst>
-                          </p:cTn>
-                        </p:par>
-                      </p:childTnLst>
-                    </p:cTn>
-                  </p:par>
-                  <p:par>
-                    <p:cTn id="11" fill="hold" nodeType="clickPar">
-                      <p:stCondLst>
-                        <p:cond delay="indefinite"/>
-                      </p:stCondLst>
-                      <p:childTnLst>
-                        <p:par>
-                          <p:cTn id="12" fill="hold" nodeType="withGroup">
-                            <p:stCondLst>
-                              <p:cond delay="0"/>
-                            </p:stCondLst>
-                            <p:childTnLst>
-                              <p:par>
-                                <p:cTn id="13" presetID="4" presetClass="entr" presetSubtype="16" fill="hold" grpId="0" nodeType="clickEffect">
-                                  <p:stCondLst>
-                                    <p:cond delay="0"/>
-                                  </p:stCondLst>
-                                  <p:childTnLst>
-                                    <p:set>
-                                      <p:cBhvr>
-                                        <p:cTn id="14" dur="1" fill="hold">
-                                          <p:stCondLst>
-                                            <p:cond delay="0"/>
-                                          </p:stCondLst>
-                                        </p:cTn>
-                                        <p:tgtEl>
-                                          <p:spTgt spid="137224"/>
-                                        </p:tgtEl>
-                                        <p:attrNameLst>
-                                          <p:attrName>style.visibility</p:attrName>
-                                        </p:attrNameLst>
-                                      </p:cBhvr>
-                                      <p:to>
-                                        <p:strVal val="visible"/>
-                                      </p:to>
-                                    </p:set>
-                                    <p:animEffect transition="in" filter="box(in)">
-                                      <p:cBhvr>
-                                        <p:cTn id="15" dur="500"/>
-                                        <p:tgtEl>
-                                          <p:spTgt spid="137224"/>
-                                        </p:tgtEl>
-                                      </p:cBhvr>
-                                    </p:animEffect>
-                                  </p:childTnLst>
-                                </p:cTn>
-                              </p:par>
-                            </p:childTnLst>
-                          </p:cTn>
-                        </p:par>
-                      </p:childTnLst>
-                    </p:cTn>
-                  </p:par>
-                  <p:par>
-                    <p:cTn id="16" fill="hold" nodeType="clickPar">
-                      <p:stCondLst>
-                        <p:cond delay="indefinite"/>
-                      </p:stCondLst>
-                      <p:childTnLst>
-                        <p:par>
-                          <p:cTn id="17" fill="hold" nodeType="withGroup">
-                            <p:stCondLst>
-                              <p:cond delay="0"/>
-                            </p:stCondLst>
-                            <p:childTnLst>
-                              <p:par>
-                                <p:cTn id="18" presetID="3" presetClass="entr" presetSubtype="10" fill="hold" nodeType="clickEffect">
-                                  <p:stCondLst>
-                                    <p:cond delay="0"/>
-                                  </p:stCondLst>
-                                  <p:childTnLst>
-                                    <p:set>
-                                      <p:cBhvr>
-                                        <p:cTn id="19" dur="1" fill="hold">
-                                          <p:stCondLst>
-                                            <p:cond delay="0"/>
-                                          </p:stCondLst>
-                                        </p:cTn>
-                                        <p:tgtEl>
-                                          <p:spTgt spid="137222"/>
-                                        </p:tgtEl>
-                                        <p:attrNameLst>
-                                          <p:attrName>style.visibility</p:attrName>
-                                        </p:attrNameLst>
-                                      </p:cBhvr>
-                                      <p:to>
-                                        <p:strVal val="visible"/>
-                                      </p:to>
-                                    </p:set>
-                                    <p:animEffect transition="in" filter="blinds(horizontal)">
-                                      <p:cBhvr>
-                                        <p:cTn id="20" dur="500"/>
-                                        <p:tgtEl>
-                                          <p:spTgt spid="137222"/>
-                                        </p:tgtEl>
-                                      </p:cBhvr>
-                                    </p:animEffect>
-                                  </p:childTnLst>
-                                </p:cTn>
-                              </p:par>
-                            </p:childTnLst>
-                          </p:cTn>
-                        </p:par>
-                      </p:childTnLst>
-                    </p:cTn>
-                  </p:par>
-                  <p:par>
-                    <p:cTn id="21" fill="hold" nodeType="clickPar">
-                      <p:stCondLst>
-                        <p:cond delay="indefinite"/>
-                      </p:stCondLst>
-                      <p:childTnLst>
-                        <p:par>
-                          <p:cTn id="22" fill="hold" nodeType="withGroup">
-                            <p:stCondLst>
-                              <p:cond delay="0"/>
-                            </p:stCondLst>
-                            <p:childTnLst>
-                              <p:par>
-                                <p:cTn id="23" presetID="4" presetClass="entr" presetSubtype="16" fill="hold" grpId="0" nodeType="clickEffect">
-                                  <p:stCondLst>
-                                    <p:cond delay="0"/>
-                                  </p:stCondLst>
-                                  <p:childTnLst>
-                                    <p:set>
-                                      <p:cBhvr>
-                                        <p:cTn id="24" dur="1" fill="hold">
-                                          <p:stCondLst>
-                                            <p:cond delay="0"/>
-                                          </p:stCondLst>
-                                        </p:cTn>
-                                        <p:tgtEl>
-                                          <p:spTgt spid="137225"/>
-                                        </p:tgtEl>
-                                        <p:attrNameLst>
-                                          <p:attrName>style.visibility</p:attrName>
-                                        </p:attrNameLst>
-                                      </p:cBhvr>
-                                      <p:to>
-                                        <p:strVal val="visible"/>
-                                      </p:to>
-                                    </p:set>
-                                    <p:animEffect transition="in" filter="box(in)">
-                                      <p:cBhvr>
-                                        <p:cTn id="25" dur="500"/>
-                                        <p:tgtEl>
-                                          <p:spTgt spid="137225"/>
-                                        </p:tgtEl>
-                                      </p:cBhvr>
-                                    </p:animEffect>
-                                  </p:childTnLst>
-                                </p:cTn>
-                              </p:par>
-                            </p:childTnLst>
-                          </p:cTn>
-                        </p:par>
-                      </p:childTnLst>
-                    </p:cTn>
-                  </p:par>
-                  <p:par>
-                    <p:cTn id="26" fill="hold" nodeType="clickPar">
-                      <p:stCondLst>
-                        <p:cond delay="indefinite"/>
-                      </p:stCondLst>
-                      <p:childTnLst>
-                        <p:par>
-                          <p:cTn id="27" fill="hold" nodeType="withGroup">
-                            <p:stCondLst>
-                              <p:cond delay="0"/>
-                            </p:stCondLst>
-                            <p:childTnLst>
-                              <p:par>
-                                <p:cTn id="28" presetID="3" presetClass="entr" presetSubtype="10" fill="hold" nodeType="clickEffect">
-                                  <p:stCondLst>
-                                    <p:cond delay="0"/>
-                                  </p:stCondLst>
-                                  <p:childTnLst>
-                                    <p:set>
-                                      <p:cBhvr>
-                                        <p:cTn id="29" dur="1" fill="hold">
-                                          <p:stCondLst>
-                                            <p:cond delay="0"/>
-                                          </p:stCondLst>
-                                        </p:cTn>
-                                        <p:tgtEl>
-                                          <p:spTgt spid="137226"/>
-                                        </p:tgtEl>
-                                        <p:attrNameLst>
-                                          <p:attrName>style.visibility</p:attrName>
-                                        </p:attrNameLst>
-                                      </p:cBhvr>
-                                      <p:to>
-                                        <p:strVal val="visible"/>
-                                      </p:to>
-                                    </p:set>
-                                    <p:animEffect transition="in" filter="blinds(horizontal)">
-                                      <p:cBhvr>
-                                        <p:cTn id="30" dur="500"/>
-                                        <p:tgtEl>
-                                          <p:spTgt spid="137226"/>
-                                        </p:tgtEl>
-                                      </p:cBhvr>
-                                    </p:animEffect>
-                                  </p:childTnLst>
-                                </p:cTn>
-                              </p:par>
-                            </p:childTnLst>
-                          </p:cTn>
-                        </p:par>
-                      </p:childTnLst>
-                    </p:cTn>
-                  </p:par>
-                  <p:par>
-                    <p:cTn id="31" fill="hold" nodeType="clickPar">
-                      <p:stCondLst>
-                        <p:cond delay="indefinite"/>
-                      </p:stCondLst>
-                      <p:childTnLst>
-                        <p:par>
-                          <p:cTn id="32" fill="hold" nodeType="withGroup">
-                            <p:stCondLst>
-                              <p:cond delay="0"/>
-                            </p:stCondLst>
-                            <p:childTnLst>
-                              <p:par>
-                                <p:cTn id="33" presetID="4" presetClass="entr" presetSubtype="16" fill="hold" grpId="0" nodeType="clickEffect">
-                                  <p:stCondLst>
-                                    <p:cond delay="0"/>
-                                  </p:stCondLst>
-                                  <p:childTnLst>
-                                    <p:set>
-                                      <p:cBhvr>
-                                        <p:cTn id="34" dur="1" fill="hold">
-                                          <p:stCondLst>
-                                            <p:cond delay="0"/>
-                                          </p:stCondLst>
-                                        </p:cTn>
-                                        <p:tgtEl>
-                                          <p:spTgt spid="137228"/>
-                                        </p:tgtEl>
-                                        <p:attrNameLst>
-                                          <p:attrName>style.visibility</p:attrName>
-                                        </p:attrNameLst>
-                                      </p:cBhvr>
-                                      <p:to>
-                                        <p:strVal val="visible"/>
-                                      </p:to>
-                                    </p:set>
-                                    <p:animEffect transition="in" filter="box(in)">
-                                      <p:cBhvr>
-                                        <p:cTn id="35" dur="500"/>
-                                        <p:tgtEl>
-                                          <p:spTgt spid="137228"/>
-                                        </p:tgtEl>
-                                      </p:cBhvr>
-                                    </p:animEffect>
-                                  </p:childTnLst>
-                                </p:cTn>
-                              </p:par>
-                            </p:childTnLst>
-                          </p:cTn>
-                        </p:par>
-                      </p:childTnLst>
-                    </p:cTn>
-                  </p:par>
-                  <p:par>
-                    <p:cTn id="36" fill="hold" nodeType="clickPar">
-                      <p:stCondLst>
-                        <p:cond delay="indefinite"/>
-                      </p:stCondLst>
-                      <p:childTnLst>
-                        <p:par>
-                          <p:cTn id="37" fill="hold" nodeType="withGroup">
-                            <p:stCondLst>
-                              <p:cond delay="0"/>
-                            </p:stCondLst>
-                            <p:childTnLst>
-                              <p:par>
-                                <p:cTn id="38" presetID="4" presetClass="entr" presetSubtype="16" fill="hold" grpId="0" nodeType="clickEffect">
-                                  <p:stCondLst>
-                                    <p:cond delay="0"/>
-                                  </p:stCondLst>
-                                  <p:childTnLst>
-                                    <p:set>
-                                      <p:cBhvr>
-                                        <p:cTn id="39" dur="1" fill="hold">
-                                          <p:stCondLst>
-                                            <p:cond delay="0"/>
-                                          </p:stCondLst>
-                                        </p:cTn>
-                                        <p:tgtEl>
-                                          <p:spTgt spid="137230"/>
-                                        </p:tgtEl>
-                                        <p:attrNameLst>
-                                          <p:attrName>style.visibility</p:attrName>
-                                        </p:attrNameLst>
-                                      </p:cBhvr>
-                                      <p:to>
-                                        <p:strVal val="visible"/>
-                                      </p:to>
-                                    </p:set>
-                                    <p:animEffect transition="in" filter="box(in)">
-                                      <p:cBhvr>
-                                        <p:cTn id="40" dur="500"/>
-                                        <p:tgtEl>
-                                          <p:spTgt spid="137230"/>
-                                        </p:tgtEl>
-                                      </p:cBhvr>
-                                    </p:animEffect>
-                                  </p:childTnLst>
-                                </p:cTn>
-                              </p:par>
-                            </p:childTnLst>
-                          </p:cTn>
-                        </p:par>
-                      </p:childTnLst>
-                    </p:cTn>
-                  </p:par>
-                  <p:par>
-                    <p:cTn id="41" fill="hold" nodeType="clickPar">
-                      <p:stCondLst>
-                        <p:cond delay="indefinite"/>
-                      </p:stCondLst>
-                      <p:childTnLst>
-                        <p:par>
-                          <p:cTn id="42" fill="hold" nodeType="withGroup">
-                            <p:stCondLst>
-                              <p:cond delay="0"/>
-                            </p:stCondLst>
-                            <p:childTnLst>
-                              <p:par>
-                                <p:cTn id="43" presetID="3" presetClass="entr" presetSubtype="10" fill="hold" nodeType="clickEffect">
-                                  <p:stCondLst>
-                                    <p:cond delay="0"/>
-                                  </p:stCondLst>
-                                  <p:childTnLst>
-                                    <p:set>
-                                      <p:cBhvr>
-                                        <p:cTn id="44" dur="1" fill="hold">
-                                          <p:stCondLst>
-                                            <p:cond delay="0"/>
-                                          </p:stCondLst>
-                                        </p:cTn>
-                                        <p:tgtEl>
-                                          <p:spTgt spid="137229"/>
-                                        </p:tgtEl>
-                                        <p:attrNameLst>
-                                          <p:attrName>style.visibility</p:attrName>
-                                        </p:attrNameLst>
-                                      </p:cBhvr>
-                                      <p:to>
-                                        <p:strVal val="visible"/>
-                                      </p:to>
-                                    </p:set>
-                                    <p:animEffect transition="in" filter="blinds(horizontal)">
-                                      <p:cBhvr>
-                                        <p:cTn id="45" dur="500"/>
-                                        <p:tgtEl>
-                                          <p:spTgt spid="137229"/>
-                                        </p:tgtEl>
-                                      </p:cBhvr>
-                                    </p:animEffect>
-                                  </p:childTnLst>
-                                </p:cTn>
-                              </p:par>
-                            </p:childTnLst>
-                          </p:cTn>
-                        </p:par>
-                      </p:childTnLst>
-                    </p:cTn>
-                  </p:par>
-                  <p:par>
-                    <p:cTn id="46" fill="hold" nodeType="clickPar">
-                      <p:stCondLst>
-                        <p:cond delay="indefinite"/>
-                      </p:stCondLst>
-                      <p:childTnLst>
-                        <p:par>
-                          <p:cTn id="47" fill="hold" nodeType="withGroup">
-                            <p:stCondLst>
-                              <p:cond delay="0"/>
-                            </p:stCondLst>
-                            <p:childTnLst>
-                              <p:par>
-                                <p:cTn id="48" presetID="4" presetClass="entr" presetSubtype="16" fill="hold" grpId="0" nodeType="clickEffect">
-                                  <p:stCondLst>
-                                    <p:cond delay="0"/>
-                                  </p:stCondLst>
-                                  <p:childTnLst>
-                                    <p:set>
-                                      <p:cBhvr>
-                                        <p:cTn id="49" dur="1" fill="hold">
-                                          <p:stCondLst>
-                                            <p:cond delay="0"/>
-                                          </p:stCondLst>
-                                        </p:cTn>
-                                        <p:tgtEl>
-                                          <p:spTgt spid="137231"/>
-                                        </p:tgtEl>
-                                        <p:attrNameLst>
-                                          <p:attrName>style.visibility</p:attrName>
-                                        </p:attrNameLst>
-                                      </p:cBhvr>
-                                      <p:to>
-                                        <p:strVal val="visible"/>
-                                      </p:to>
-                                    </p:set>
-                                    <p:animEffect transition="in" filter="box(in)">
-                                      <p:cBhvr>
-                                        <p:cTn id="50" dur="500"/>
-                                        <p:tgtEl>
-                                          <p:spTgt spid="137231"/>
-                                        </p:tgtEl>
-                                      </p:cBhvr>
-                                    </p:animEffect>
-                                  </p:childTnLst>
-                                </p:cTn>
-                              </p:par>
-                            </p:childTnLst>
-                          </p:cTn>
-                        </p:par>
-                      </p:childTnLst>
-                    </p:cTn>
-                  </p:par>
-                  <p:par>
-                    <p:cTn id="51" fill="hold" nodeType="clickPar">
-                      <p:stCondLst>
-                        <p:cond delay="indefinite"/>
-                      </p:stCondLst>
-                      <p:childTnLst>
-                        <p:par>
-                          <p:cTn id="52" fill="hold" nodeType="withGroup">
-                            <p:stCondLst>
-                              <p:cond delay="0"/>
-                            </p:stCondLst>
-                            <p:childTnLst>
-                              <p:par>
-                                <p:cTn id="53" presetID="3" presetClass="entr" presetSubtype="10" fill="hold" nodeType="clickEffect">
-                                  <p:stCondLst>
-                                    <p:cond delay="0"/>
-                                  </p:stCondLst>
-                                  <p:childTnLst>
-                                    <p:set>
-                                      <p:cBhvr>
-                                        <p:cTn id="54" dur="1" fill="hold">
-                                          <p:stCondLst>
-                                            <p:cond delay="0"/>
-                                          </p:stCondLst>
-                                        </p:cTn>
-                                        <p:tgtEl>
-                                          <p:spTgt spid="137238"/>
-                                        </p:tgtEl>
-                                        <p:attrNameLst>
-                                          <p:attrName>style.visibility</p:attrName>
-                                        </p:attrNameLst>
-                                      </p:cBhvr>
-                                      <p:to>
-                                        <p:strVal val="visible"/>
-                                      </p:to>
-                                    </p:set>
-                                    <p:animEffect transition="in" filter="blinds(horizontal)">
-                                      <p:cBhvr>
-                                        <p:cTn id="55" dur="500"/>
-                                        <p:tgtEl>
-                                          <p:spTgt spid="137238"/>
-                                        </p:tgtEl>
-                                      </p:cBhvr>
-                                    </p:animEffect>
-                                  </p:childTnLst>
-                                </p:cTn>
-                              </p:par>
-                            </p:childTnLst>
-                          </p:cTn>
-                        </p:par>
-                      </p:childTnLst>
-                    </p:cTn>
-                  </p:par>
-                  <p:par>
-                    <p:cTn id="56" fill="hold" nodeType="clickPar">
-                      <p:stCondLst>
-                        <p:cond delay="indefinite"/>
-                      </p:stCondLst>
-                      <p:childTnLst>
-                        <p:par>
-                          <p:cTn id="57" fill="hold" nodeType="withGroup">
-                            <p:stCondLst>
-                              <p:cond delay="0"/>
-                            </p:stCondLst>
-                            <p:childTnLst>
-                              <p:par>
-                                <p:cTn id="58" presetID="4" presetClass="entr" presetSubtype="16" fill="hold" grpId="0" nodeType="clickEffect">
-                                  <p:stCondLst>
-                                    <p:cond delay="0"/>
-                                  </p:stCondLst>
-                                  <p:childTnLst>
-                                    <p:set>
-                                      <p:cBhvr>
-                                        <p:cTn id="59" dur="1" fill="hold">
-                                          <p:stCondLst>
-                                            <p:cond delay="0"/>
-                                          </p:stCondLst>
-                                        </p:cTn>
-                                        <p:tgtEl>
-                                          <p:spTgt spid="137234"/>
-                                        </p:tgtEl>
-                                        <p:attrNameLst>
-                                          <p:attrName>style.visibility</p:attrName>
-                                        </p:attrNameLst>
-                                      </p:cBhvr>
-                                      <p:to>
-                                        <p:strVal val="visible"/>
-                                      </p:to>
-                                    </p:set>
-                                    <p:animEffect transition="in" filter="box(in)">
-                                      <p:cBhvr>
-                                        <p:cTn id="60" dur="500"/>
-                                        <p:tgtEl>
-                                          <p:spTgt spid="137234"/>
-                                        </p:tgtEl>
-                                      </p:cBhvr>
-                                    </p:animEffect>
-                                  </p:childTnLst>
-                                </p:cTn>
-                              </p:par>
-                            </p:childTnLst>
-                          </p:cTn>
-                        </p:par>
-                      </p:childTnLst>
-                    </p:cTn>
-                  </p:par>
-                </p:childTnLst>
-              </p:cTn>
-              <p:prevCondLst>
-                <p:cond evt="onPrev" delay="0">
-                  <p:tgtEl>
-                    <p:sldTgt/>
-                  </p:tgtEl>
-                </p:cond>
-              </p:prevCondLst>
-              <p:nextCondLst>
-                <p:cond evt="onNext" delay="0">
-                  <p:tgtEl>
-                    <p:sldTgt/>
-                  </p:tgtEl>
-                </p:cond>
-              </p:nextCondLst>
-            </p:seq>
-          </p:childTnLst>
-        </p:cTn>
-      </p:par>
-    </p:tnLst>
-    <p:bldLst>
-      <p:bldP spid="137220" grpId="0" build="allAtOnce" animBg="1"/>
-      <p:bldP spid="137224" grpId="0"/>
-      <p:bldP spid="137225" grpId="0" animBg="1"/>
-      <p:bldP spid="137228" grpId="0" animBg="1"/>
-      <p:bldP spid="137230" grpId="0"/>
-      <p:bldP spid="137231" grpId="0" animBg="1"/>
-      <p:bldP spid="137234" grpId="0" animBg="1"/>
-    </p:bldLst>
-  </p:timing>
-</p:sld>
-</file>
-
-<file path=ppt/slides/slide5.xml><?xml version="1.0" encoding="utf-8"?>
 <p:sld xmlns:a="http://schemas.openxmlformats.org/drawingml/2006/main" xmlns:r="http://schemas.openxmlformats.org/officeDocument/2006/relationships" xmlns:p="http://schemas.openxmlformats.org/presentationml/2006/main" showMasterPhAnim="0">
   <p:cSld>
     <p:spTree>

</xml_diff>